<commit_message>
updated Day 6 training materials
</commit_message>
<xml_diff>
--- a/Day 6/Slides/3. Introduction to JDBC/introduction-to-jdbc-slides.pptx
+++ b/Day 6/Slides/3. Introduction to JDBC/introduction-to-jdbc-slides.pptx
@@ -222,7 +222,7 @@
           <a:p>
             <a:fld id="{3EFD42F7-718C-4B98-AAEC-167E6DDD60A7}" type="datetimeFigureOut">
               <a:rPr lang="en-US" smtClean="0"/>
-              <a:t>8/6/2023</a:t>
+              <a:t>8/10/2023</a:t>
             </a:fld>
             <a:endParaRPr lang="en-US"/>
           </a:p>
@@ -627,7 +627,7 @@
           <a:p>
             <a:fld id="{1D8BD707-D9CF-40AE-B4C6-C98DA3205C09}" type="datetimeFigureOut">
               <a:rPr lang="en-US"/>
-              <a:t>8/6/2023</a:t>
+              <a:t>8/10/2023</a:t>
             </a:fld>
             <a:endParaRPr lang="en-US"/>
           </a:p>
@@ -806,7 +806,7 @@
           <a:p>
             <a:fld id="{1D8BD707-D9CF-40AE-B4C6-C98DA3205C09}" type="datetimeFigureOut">
               <a:rPr lang="en-US"/>
-              <a:t>8/6/2023</a:t>
+              <a:t>8/10/2023</a:t>
             </a:fld>
             <a:endParaRPr lang="en-US"/>
           </a:p>
@@ -1152,7 +1152,7 @@
           <a:p>
             <a:fld id="{1D8BD707-D9CF-40AE-B4C6-C98DA3205C09}" type="datetimeFigureOut">
               <a:rPr lang="en-US"/>
-              <a:t>8/6/2023</a:t>
+              <a:t>8/10/2023</a:t>
             </a:fld>
             <a:endParaRPr lang="en-US"/>
           </a:p>
@@ -1302,7 +1302,7 @@
           <a:p>
             <a:fld id="{1D8BD707-D9CF-40AE-B4C6-C98DA3205C09}" type="datetimeFigureOut">
               <a:rPr lang="en-US"/>
-              <a:t>8/6/2023</a:t>
+              <a:t>8/10/2023</a:t>
             </a:fld>
             <a:endParaRPr lang="en-US"/>
           </a:p>
@@ -1553,7 +1553,7 @@
           <a:p>
             <a:fld id="{1D8BD707-D9CF-40AE-B4C6-C98DA3205C09}" type="datetimeFigureOut">
               <a:rPr lang="en-US"/>
-              <a:t>8/6/2023</a:t>
+              <a:t>8/10/2023</a:t>
             </a:fld>
             <a:endParaRPr lang="en-US"/>
           </a:p>
@@ -1780,7 +1780,7 @@
           <a:p>
             <a:fld id="{1D8BD707-D9CF-40AE-B4C6-C98DA3205C09}" type="datetimeFigureOut">
               <a:rPr lang="en-US"/>
-              <a:t>8/6/2023</a:t>
+              <a:t>8/10/2023</a:t>
             </a:fld>
             <a:endParaRPr lang="en-US"/>
           </a:p>
@@ -6073,15 +6073,19 @@
               </a:spcBef>
             </a:pPr>
             <a:r>
-              <a:rPr sz="5400" dirty="0">
+              <a:rPr lang="en-US" sz="5400" spc="-80" dirty="0">
                 <a:solidFill>
                   <a:srgbClr val="FFFFFF"/>
                 </a:solidFill>
-                <a:latin typeface="Verdana" panose="020B0604030504040204"/>
-                <a:cs typeface="Verdana" panose="020B0604030504040204"/>
-              </a:rPr>
-              <a:t>Assisted Practice</a:t>
-            </a:r>
+                <a:latin typeface="Microsoft Sans Serif" panose="020B0604020202020204"/>
+                <a:cs typeface="Microsoft Sans Serif" panose="020B0604020202020204"/>
+              </a:rPr>
+              <a:t>Demo</a:t>
+            </a:r>
+            <a:endParaRPr lang="en-US" sz="5400" dirty="0">
+              <a:latin typeface="Microsoft Sans Serif" panose="020B0604020202020204"/>
+              <a:cs typeface="Microsoft Sans Serif" panose="020B0604020202020204"/>
+            </a:endParaRPr>
           </a:p>
         </p:txBody>
       </p:sp>

</xml_diff>